<commit_message>
Contains looping code to calculate percent change year by year
</commit_message>
<xml_diff>
--- a/Kelly/Crime Trends in the Atlanta Area.pptx
+++ b/Kelly/Crime Trends in the Atlanta Area.pptx
@@ -9,9 +9,16 @@
     <p:sldId id="301" r:id="rId6"/>
     <p:sldId id="302" r:id="rId7"/>
     <p:sldId id="303" r:id="rId8"/>
-    <p:sldId id="304" r:id="rId9"/>
-    <p:sldId id="305" r:id="rId10"/>
-    <p:sldId id="306" r:id="rId11"/>
+    <p:sldId id="310" r:id="rId9"/>
+    <p:sldId id="311" r:id="rId10"/>
+    <p:sldId id="312" r:id="rId11"/>
+    <p:sldId id="308" r:id="rId12"/>
+    <p:sldId id="309" r:id="rId13"/>
+    <p:sldId id="313" r:id="rId14"/>
+    <p:sldId id="304" r:id="rId15"/>
+    <p:sldId id="305" r:id="rId16"/>
+    <p:sldId id="306" r:id="rId17"/>
+    <p:sldId id="307" r:id="rId18"/>
   </p:sldIdLst>
   <p:sldSz cx="12192000" cy="6858000"/>
   <p:notesSz cx="6858000" cy="9144000"/>
@@ -362,7 +369,7 @@
           <a:p>
             <a:fld id="{9184DA70-C731-4C70-880D-CCD4705E623C}" type="datetime1">
               <a:rPr lang="en-US" smtClean="0"/>
-              <a:t>2/8/2021</a:t>
+              <a:t>2/9/2021</a:t>
             </a:fld>
             <a:endParaRPr lang="en-US" dirty="0"/>
           </a:p>
@@ -550,7 +557,7 @@
           <a:p>
             <a:fld id="{4BE1D723-8F53-4F53-90B0-1982A396982E}" type="datetime1">
               <a:rPr lang="en-US" smtClean="0"/>
-              <a:t>2/8/2021</a:t>
+              <a:t>2/9/2021</a:t>
             </a:fld>
             <a:endParaRPr lang="en-US" dirty="0"/>
           </a:p>
@@ -923,7 +930,7 @@
           <a:p>
             <a:fld id="{97669AF7-7BEB-44E4-9852-375E34362B5B}" type="datetime1">
               <a:rPr lang="en-US" smtClean="0"/>
-              <a:t>2/8/2021</a:t>
+              <a:t>2/9/2021</a:t>
             </a:fld>
             <a:endParaRPr lang="en-US" dirty="0"/>
           </a:p>
@@ -1178,7 +1185,7 @@
           <a:p>
             <a:fld id="{BAAAC38D-0552-4C82-B593-E6124DFADBE2}" type="datetime1">
               <a:rPr lang="en-US" smtClean="0"/>
-              <a:t>2/8/2021</a:t>
+              <a:t>2/9/2021</a:t>
             </a:fld>
             <a:endParaRPr lang="en-US" dirty="0"/>
           </a:p>
@@ -1575,7 +1582,7 @@
           <a:p>
             <a:fld id="{D9DF0F1C-5577-4ACB-BB62-DF8F3C494C7E}" type="datetime1">
               <a:rPr lang="en-US" smtClean="0"/>
-              <a:t>2/8/2021</a:t>
+              <a:t>2/9/2021</a:t>
             </a:fld>
             <a:endParaRPr lang="en-US" dirty="0"/>
           </a:p>
@@ -1711,7 +1718,7 @@
           <a:p>
             <a:fld id="{1775B394-D9F9-4F0C-B15D-605F45CB9E9F}" type="datetime1">
               <a:rPr lang="en-US" smtClean="0"/>
-              <a:t>2/8/2021</a:t>
+              <a:t>2/9/2021</a:t>
             </a:fld>
             <a:endParaRPr lang="en-US" dirty="0"/>
           </a:p>
@@ -1868,7 +1875,7 @@
           <a:p>
             <a:fld id="{39667345-2558-425A-8533-9BFDBCE15005}" type="datetime1">
               <a:rPr lang="en-US" smtClean="0"/>
-              <a:t>2/8/2021</a:t>
+              <a:t>2/9/2021</a:t>
             </a:fld>
             <a:endParaRPr lang="en-US" dirty="0"/>
           </a:p>
@@ -2197,7 +2204,7 @@
           <a:p>
             <a:fld id="{92BEA474-078D-4E9B-9B14-09A87B19DC46}" type="datetime1">
               <a:rPr lang="en-US" smtClean="0"/>
-              <a:t>2/8/2021</a:t>
+              <a:t>2/9/2021</a:t>
             </a:fld>
             <a:endParaRPr lang="en-US" dirty="0"/>
           </a:p>
@@ -2547,7 +2554,7 @@
           <a:p>
             <a:fld id="{4907D986-8816-4272-A432-0437A28A9828}" type="datetime1">
               <a:rPr lang="en-US" smtClean="0"/>
-              <a:t>2/8/2021</a:t>
+              <a:t>2/9/2021</a:t>
             </a:fld>
             <a:endParaRPr lang="en-US" dirty="0"/>
           </a:p>
@@ -2808,7 +2815,7 @@
           <a:p>
             <a:fld id="{62D6E202-B606-4609-B914-27C9371A1F6D}" type="datetime1">
               <a:rPr lang="en-US" smtClean="0"/>
-              <a:t>2/8/2021</a:t>
+              <a:t>2/9/2021</a:t>
             </a:fld>
             <a:endParaRPr lang="en-US" dirty="0"/>
           </a:p>
@@ -3779,6 +3786,469 @@
 </p:sld>
 </file>
 
+<file path=ppt/slides/slide10.xml><?xml version="1.0" encoding="utf-8"?>
+<p:sld xmlns:a="http://schemas.openxmlformats.org/drawingml/2006/main" xmlns:r="http://schemas.openxmlformats.org/officeDocument/2006/relationships" xmlns:p="http://schemas.openxmlformats.org/presentationml/2006/main">
+  <p:cSld>
+    <p:spTree>
+      <p:nvGrpSpPr>
+        <p:cNvPr id="1" name=""/>
+        <p:cNvGrpSpPr/>
+        <p:nvPr/>
+      </p:nvGrpSpPr>
+      <p:grpSpPr>
+        <a:xfrm>
+          <a:off x="0" y="0"/>
+          <a:ext cx="0" cy="0"/>
+          <a:chOff x="0" y="0"/>
+          <a:chExt cx="0" cy="0"/>
+        </a:xfrm>
+      </p:grpSpPr>
+      <p:sp>
+        <p:nvSpPr>
+          <p:cNvPr id="2" name="Title 1">
+            <a:extLst>
+              <a:ext uri="{FF2B5EF4-FFF2-40B4-BE49-F238E27FC236}">
+                <a16:creationId xmlns:a16="http://schemas.microsoft.com/office/drawing/2014/main" id="{1BB6AA29-9625-48AA-A257-70D7B9EA834B}"/>
+              </a:ext>
+            </a:extLst>
+          </p:cNvPr>
+          <p:cNvSpPr>
+            <a:spLocks noGrp="1"/>
+          </p:cNvSpPr>
+          <p:nvPr>
+            <p:ph type="title"/>
+          </p:nvPr>
+        </p:nvSpPr>
+        <p:spPr/>
+        <p:txBody>
+          <a:bodyPr/>
+          <a:lstStyle/>
+          <a:p>
+            <a:r>
+              <a:rPr lang="en-US" dirty="0"/>
+              <a:t>Neighborhoods</a:t>
+            </a:r>
+          </a:p>
+        </p:txBody>
+      </p:sp>
+      <p:sp>
+        <p:nvSpPr>
+          <p:cNvPr id="3" name="Content Placeholder 2">
+            <a:extLst>
+              <a:ext uri="{FF2B5EF4-FFF2-40B4-BE49-F238E27FC236}">
+                <a16:creationId xmlns:a16="http://schemas.microsoft.com/office/drawing/2014/main" id="{A6345841-6403-4F43-A0F2-DDB58E9AF47D}"/>
+              </a:ext>
+            </a:extLst>
+          </p:cNvPr>
+          <p:cNvSpPr>
+            <a:spLocks noGrp="1"/>
+          </p:cNvSpPr>
+          <p:nvPr>
+            <p:ph idx="1"/>
+          </p:nvPr>
+        </p:nvSpPr>
+        <p:spPr/>
+        <p:txBody>
+          <a:bodyPr/>
+          <a:lstStyle/>
+          <a:p>
+            <a:endParaRPr lang="en-US"/>
+          </a:p>
+        </p:txBody>
+      </p:sp>
+    </p:spTree>
+    <p:extLst>
+      <p:ext uri="{BB962C8B-B14F-4D97-AF65-F5344CB8AC3E}">
+        <p14:creationId xmlns:p14="http://schemas.microsoft.com/office/powerpoint/2010/main" val="3327042404"/>
+      </p:ext>
+    </p:extLst>
+  </p:cSld>
+  <p:clrMapOvr>
+    <a:masterClrMapping/>
+  </p:clrMapOvr>
+</p:sld>
+</file>
+
+<file path=ppt/slides/slide11.xml><?xml version="1.0" encoding="utf-8"?>
+<p:sld xmlns:a="http://schemas.openxmlformats.org/drawingml/2006/main" xmlns:r="http://schemas.openxmlformats.org/officeDocument/2006/relationships" xmlns:p="http://schemas.openxmlformats.org/presentationml/2006/main">
+  <p:cSld>
+    <p:spTree>
+      <p:nvGrpSpPr>
+        <p:cNvPr id="1" name=""/>
+        <p:cNvGrpSpPr/>
+        <p:nvPr/>
+      </p:nvGrpSpPr>
+      <p:grpSpPr>
+        <a:xfrm>
+          <a:off x="0" y="0"/>
+          <a:ext cx="0" cy="0"/>
+          <a:chOff x="0" y="0"/>
+          <a:chExt cx="0" cy="0"/>
+        </a:xfrm>
+      </p:grpSpPr>
+      <p:sp>
+        <p:nvSpPr>
+          <p:cNvPr id="2" name="Title 1">
+            <a:extLst>
+              <a:ext uri="{FF2B5EF4-FFF2-40B4-BE49-F238E27FC236}">
+                <a16:creationId xmlns:a16="http://schemas.microsoft.com/office/drawing/2014/main" id="{F1F68E24-76C8-457B-A274-B5A2775BDD21}"/>
+              </a:ext>
+            </a:extLst>
+          </p:cNvPr>
+          <p:cNvSpPr>
+            <a:spLocks noGrp="1"/>
+          </p:cNvSpPr>
+          <p:nvPr>
+            <p:ph type="title"/>
+          </p:nvPr>
+        </p:nvSpPr>
+        <p:spPr/>
+        <p:txBody>
+          <a:bodyPr/>
+          <a:lstStyle/>
+          <a:p>
+            <a:r>
+              <a:rPr lang="en-US" dirty="0"/>
+              <a:t>Discussion/Conclusions</a:t>
+            </a:r>
+          </a:p>
+        </p:txBody>
+      </p:sp>
+      <p:sp>
+        <p:nvSpPr>
+          <p:cNvPr id="3" name="Content Placeholder 2">
+            <a:extLst>
+              <a:ext uri="{FF2B5EF4-FFF2-40B4-BE49-F238E27FC236}">
+                <a16:creationId xmlns:a16="http://schemas.microsoft.com/office/drawing/2014/main" id="{EE297F6F-7E84-4BDD-8ACA-A0E58C2A6D7E}"/>
+              </a:ext>
+            </a:extLst>
+          </p:cNvPr>
+          <p:cNvSpPr>
+            <a:spLocks noGrp="1"/>
+          </p:cNvSpPr>
+          <p:nvPr>
+            <p:ph idx="1"/>
+          </p:nvPr>
+        </p:nvSpPr>
+        <p:spPr/>
+        <p:txBody>
+          <a:bodyPr/>
+          <a:lstStyle/>
+          <a:p>
+            <a:endParaRPr lang="en-US"/>
+          </a:p>
+        </p:txBody>
+      </p:sp>
+    </p:spTree>
+    <p:extLst>
+      <p:ext uri="{BB962C8B-B14F-4D97-AF65-F5344CB8AC3E}">
+        <p14:creationId xmlns:p14="http://schemas.microsoft.com/office/powerpoint/2010/main" val="3912194499"/>
+      </p:ext>
+    </p:extLst>
+  </p:cSld>
+  <p:clrMapOvr>
+    <a:masterClrMapping/>
+  </p:clrMapOvr>
+</p:sld>
+</file>
+
+<file path=ppt/slides/slide12.xml><?xml version="1.0" encoding="utf-8"?>
+<p:sld xmlns:a="http://schemas.openxmlformats.org/drawingml/2006/main" xmlns:r="http://schemas.openxmlformats.org/officeDocument/2006/relationships" xmlns:p="http://schemas.openxmlformats.org/presentationml/2006/main">
+  <p:cSld>
+    <p:spTree>
+      <p:nvGrpSpPr>
+        <p:cNvPr id="1" name=""/>
+        <p:cNvGrpSpPr/>
+        <p:nvPr/>
+      </p:nvGrpSpPr>
+      <p:grpSpPr>
+        <a:xfrm>
+          <a:off x="0" y="0"/>
+          <a:ext cx="0" cy="0"/>
+          <a:chOff x="0" y="0"/>
+          <a:chExt cx="0" cy="0"/>
+        </a:xfrm>
+      </p:grpSpPr>
+      <p:sp>
+        <p:nvSpPr>
+          <p:cNvPr id="2" name="Title 1">
+            <a:extLst>
+              <a:ext uri="{FF2B5EF4-FFF2-40B4-BE49-F238E27FC236}">
+                <a16:creationId xmlns:a16="http://schemas.microsoft.com/office/drawing/2014/main" id="{B7E2B5F8-0077-435F-B9B1-06619D2839A2}"/>
+              </a:ext>
+            </a:extLst>
+          </p:cNvPr>
+          <p:cNvSpPr>
+            <a:spLocks noGrp="1"/>
+          </p:cNvSpPr>
+          <p:nvPr>
+            <p:ph type="title"/>
+          </p:nvPr>
+        </p:nvSpPr>
+        <p:spPr/>
+        <p:txBody>
+          <a:bodyPr/>
+          <a:lstStyle/>
+          <a:p>
+            <a:r>
+              <a:rPr lang="en-US" dirty="0"/>
+              <a:t>If we had more time, we would…</a:t>
+            </a:r>
+          </a:p>
+        </p:txBody>
+      </p:sp>
+      <p:sp>
+        <p:nvSpPr>
+          <p:cNvPr id="3" name="Content Placeholder 2">
+            <a:extLst>
+              <a:ext uri="{FF2B5EF4-FFF2-40B4-BE49-F238E27FC236}">
+                <a16:creationId xmlns:a16="http://schemas.microsoft.com/office/drawing/2014/main" id="{D558455A-8EC9-4BCE-9B1D-233E2337B359}"/>
+              </a:ext>
+            </a:extLst>
+          </p:cNvPr>
+          <p:cNvSpPr>
+            <a:spLocks noGrp="1"/>
+          </p:cNvSpPr>
+          <p:nvPr>
+            <p:ph idx="1"/>
+          </p:nvPr>
+        </p:nvSpPr>
+        <p:spPr/>
+        <p:txBody>
+          <a:bodyPr/>
+          <a:lstStyle/>
+          <a:p>
+            <a:r>
+              <a:rPr lang="en-US" dirty="0"/>
+              <a:t>List of things we didn’t have time to discuss here…</a:t>
+            </a:r>
+          </a:p>
+        </p:txBody>
+      </p:sp>
+      <p:pic>
+        <p:nvPicPr>
+          <p:cNvPr id="2050" name="Picture 2" descr="Image result for never enough time">
+            <a:extLst>
+              <a:ext uri="{FF2B5EF4-FFF2-40B4-BE49-F238E27FC236}">
+                <a16:creationId xmlns:a16="http://schemas.microsoft.com/office/drawing/2014/main" id="{7A134D72-AA15-45B0-835B-0A2A1C66B324}"/>
+              </a:ext>
+            </a:extLst>
+          </p:cNvPr>
+          <p:cNvPicPr>
+            <a:picLocks noChangeAspect="1" noChangeArrowheads="1"/>
+          </p:cNvPicPr>
+          <p:nvPr/>
+        </p:nvPicPr>
+        <p:blipFill>
+          <a:blip r:embed="rId2">
+            <a:extLst>
+              <a:ext uri="{28A0092B-C50C-407E-A947-70E740481C1C}">
+                <a14:useLocalDpi xmlns:a14="http://schemas.microsoft.com/office/drawing/2010/main" val="0"/>
+              </a:ext>
+            </a:extLst>
+          </a:blip>
+          <a:srcRect/>
+          <a:stretch>
+            <a:fillRect/>
+          </a:stretch>
+        </p:blipFill>
+        <p:spPr bwMode="auto">
+          <a:xfrm>
+            <a:off x="8000617" y="1996750"/>
+            <a:ext cx="3155063" cy="2460949"/>
+          </a:xfrm>
+          <a:prstGeom prst="rect">
+            <a:avLst/>
+          </a:prstGeom>
+          <a:noFill/>
+          <a:extLst>
+            <a:ext uri="{909E8E84-426E-40DD-AFC4-6F175D3DCCD1}">
+              <a14:hiddenFill xmlns:a14="http://schemas.microsoft.com/office/drawing/2010/main">
+                <a:solidFill>
+                  <a:srgbClr val="FFFFFF"/>
+                </a:solidFill>
+              </a14:hiddenFill>
+            </a:ext>
+          </a:extLst>
+        </p:spPr>
+      </p:pic>
+    </p:spTree>
+    <p:extLst>
+      <p:ext uri="{BB962C8B-B14F-4D97-AF65-F5344CB8AC3E}">
+        <p14:creationId xmlns:p14="http://schemas.microsoft.com/office/powerpoint/2010/main" val="701140825"/>
+      </p:ext>
+    </p:extLst>
+  </p:cSld>
+  <p:clrMapOvr>
+    <a:masterClrMapping/>
+  </p:clrMapOvr>
+</p:sld>
+</file>
+
+<file path=ppt/slides/slide13.xml><?xml version="1.0" encoding="utf-8"?>
+<p:sld xmlns:a="http://schemas.openxmlformats.org/drawingml/2006/main" xmlns:r="http://schemas.openxmlformats.org/officeDocument/2006/relationships" xmlns:p="http://schemas.openxmlformats.org/presentationml/2006/main">
+  <p:cSld>
+    <p:spTree>
+      <p:nvGrpSpPr>
+        <p:cNvPr id="1" name=""/>
+        <p:cNvGrpSpPr/>
+        <p:nvPr/>
+      </p:nvGrpSpPr>
+      <p:grpSpPr>
+        <a:xfrm>
+          <a:off x="0" y="0"/>
+          <a:ext cx="0" cy="0"/>
+          <a:chOff x="0" y="0"/>
+          <a:chExt cx="0" cy="0"/>
+        </a:xfrm>
+      </p:grpSpPr>
+      <p:sp>
+        <p:nvSpPr>
+          <p:cNvPr id="2" name="Title 1">
+            <a:extLst>
+              <a:ext uri="{FF2B5EF4-FFF2-40B4-BE49-F238E27FC236}">
+                <a16:creationId xmlns:a16="http://schemas.microsoft.com/office/drawing/2014/main" id="{63E93BFB-3B43-4DF0-9A59-B35DF5F698E2}"/>
+              </a:ext>
+            </a:extLst>
+          </p:cNvPr>
+          <p:cNvSpPr>
+            <a:spLocks noGrp="1"/>
+          </p:cNvSpPr>
+          <p:nvPr>
+            <p:ph type="title"/>
+          </p:nvPr>
+        </p:nvSpPr>
+        <p:spPr/>
+        <p:txBody>
+          <a:bodyPr/>
+          <a:lstStyle/>
+          <a:p>
+            <a:r>
+              <a:rPr lang="en-US" dirty="0"/>
+              <a:t>Questions</a:t>
+            </a:r>
+          </a:p>
+        </p:txBody>
+      </p:sp>
+      <p:pic>
+        <p:nvPicPr>
+          <p:cNvPr id="4" name="Picture 2" descr="https://s-i.huffpost.com/gen/2774246/images/o-ASKING-QUESTIONS-facebook.jpg">
+            <a:extLst>
+              <a:ext uri="{FF2B5EF4-FFF2-40B4-BE49-F238E27FC236}">
+                <a16:creationId xmlns:a16="http://schemas.microsoft.com/office/drawing/2014/main" id="{1C787EA6-550A-428D-B577-6FEEA70CA890}"/>
+              </a:ext>
+            </a:extLst>
+          </p:cNvPr>
+          <p:cNvPicPr>
+            <a:picLocks noChangeAspect="1" noChangeArrowheads="1"/>
+          </p:cNvPicPr>
+          <p:nvPr/>
+        </p:nvPicPr>
+        <p:blipFill>
+          <a:blip r:embed="rId2" cstate="print">
+            <a:extLst>
+              <a:ext uri="{28A0092B-C50C-407E-A947-70E740481C1C}">
+                <a14:useLocalDpi xmlns:a14="http://schemas.microsoft.com/office/drawing/2010/main" val="0"/>
+              </a:ext>
+            </a:extLst>
+          </a:blip>
+          <a:srcRect/>
+          <a:stretch>
+            <a:fillRect/>
+          </a:stretch>
+        </p:blipFill>
+        <p:spPr bwMode="auto">
+          <a:xfrm>
+            <a:off x="1931324" y="2186248"/>
+            <a:ext cx="7620000" cy="3810000"/>
+          </a:xfrm>
+          <a:prstGeom prst="rect">
+            <a:avLst/>
+          </a:prstGeom>
+          <a:noFill/>
+          <a:extLst>
+            <a:ext uri="{909E8E84-426E-40DD-AFC4-6F175D3DCCD1}">
+              <a14:hiddenFill xmlns:a14="http://schemas.microsoft.com/office/drawing/2010/main">
+                <a:solidFill>
+                  <a:srgbClr val="FFFFFF"/>
+                </a:solidFill>
+              </a14:hiddenFill>
+            </a:ext>
+          </a:extLst>
+        </p:spPr>
+      </p:pic>
+    </p:spTree>
+    <p:extLst>
+      <p:ext uri="{BB962C8B-B14F-4D97-AF65-F5344CB8AC3E}">
+        <p14:creationId xmlns:p14="http://schemas.microsoft.com/office/powerpoint/2010/main" val="145803504"/>
+      </p:ext>
+    </p:extLst>
+  </p:cSld>
+  <p:clrMapOvr>
+    <a:masterClrMapping/>
+  </p:clrMapOvr>
+</p:sld>
+</file>
+
+<file path=ppt/slides/slide14.xml><?xml version="1.0" encoding="utf-8"?>
+<p:sld xmlns:a="http://schemas.openxmlformats.org/drawingml/2006/main" xmlns:r="http://schemas.openxmlformats.org/officeDocument/2006/relationships" xmlns:p="http://schemas.openxmlformats.org/presentationml/2006/main">
+  <p:cSld>
+    <p:spTree>
+      <p:nvGrpSpPr>
+        <p:cNvPr id="1" name=""/>
+        <p:cNvGrpSpPr/>
+        <p:nvPr/>
+      </p:nvGrpSpPr>
+      <p:grpSpPr>
+        <a:xfrm>
+          <a:off x="0" y="0"/>
+          <a:ext cx="0" cy="0"/>
+          <a:chOff x="0" y="0"/>
+          <a:chExt cx="0" cy="0"/>
+        </a:xfrm>
+      </p:grpSpPr>
+      <p:pic>
+        <p:nvPicPr>
+          <p:cNvPr id="5" name="Content Placeholder 4" descr="Chart, bar chart&#10;&#10;Description automatically generated">
+            <a:extLst>
+              <a:ext uri="{FF2B5EF4-FFF2-40B4-BE49-F238E27FC236}">
+                <a16:creationId xmlns:a16="http://schemas.microsoft.com/office/drawing/2014/main" id="{A06F5957-9641-4EAD-8D8C-D8AC928B70B6}"/>
+              </a:ext>
+            </a:extLst>
+          </p:cNvPr>
+          <p:cNvPicPr>
+            <a:picLocks noGrp="1" noChangeAspect="1"/>
+          </p:cNvPicPr>
+          <p:nvPr>
+            <p:ph idx="4294967295"/>
+          </p:nvPr>
+        </p:nvPicPr>
+        <p:blipFill>
+          <a:blip r:embed="rId2"/>
+          <a:stretch>
+            <a:fillRect/>
+          </a:stretch>
+        </p:blipFill>
+        <p:spPr>
+          <a:xfrm>
+            <a:off x="749883" y="94393"/>
+            <a:ext cx="9861964" cy="5802553"/>
+          </a:xfrm>
+        </p:spPr>
+      </p:pic>
+    </p:spTree>
+    <p:extLst>
+      <p:ext uri="{BB962C8B-B14F-4D97-AF65-F5344CB8AC3E}">
+        <p14:creationId xmlns:p14="http://schemas.microsoft.com/office/powerpoint/2010/main" val="3842710854"/>
+      </p:ext>
+    </p:extLst>
+  </p:cSld>
+  <p:clrMapOvr>
+    <a:masterClrMapping/>
+  </p:clrMapOvr>
+</p:sld>
+</file>
+
 <file path=ppt/slides/slide2.xml><?xml version="1.0" encoding="utf-8"?>
 <p:sld xmlns:a="http://schemas.openxmlformats.org/drawingml/2006/main" xmlns:r="http://schemas.openxmlformats.org/officeDocument/2006/relationships" xmlns:p="http://schemas.openxmlformats.org/presentationml/2006/main">
   <p:cSld>
@@ -3854,7 +4324,28 @@
             <a:pPr lvl="1"/>
             <a:r>
               <a:rPr lang="en-US" dirty="0"/>
+              <a:t>Overall amount of crime</a:t>
+            </a:r>
+          </a:p>
+          <a:p>
+            <a:pPr lvl="1"/>
+            <a:r>
+              <a:rPr lang="en-US" dirty="0"/>
               <a:t>Types of crimes committed</a:t>
+            </a:r>
+          </a:p>
+          <a:p>
+            <a:pPr lvl="1"/>
+            <a:r>
+              <a:rPr lang="en-US" dirty="0"/>
+              <a:t>Seasons of the year</a:t>
+            </a:r>
+          </a:p>
+          <a:p>
+            <a:pPr lvl="1"/>
+            <a:r>
+              <a:rPr lang="en-US" dirty="0"/>
+              <a:t>Months of the year</a:t>
             </a:r>
           </a:p>
           <a:p>
@@ -3862,13 +4353,6 @@
             <a:r>
               <a:rPr lang="en-US" dirty="0"/>
               <a:t>Time of day</a:t>
-            </a:r>
-          </a:p>
-          <a:p>
-            <a:pPr lvl="1"/>
-            <a:r>
-              <a:rPr lang="en-US" dirty="0"/>
-              <a:t>Seasons of the year</a:t>
             </a:r>
           </a:p>
           <a:p>
@@ -4251,7 +4735,7 @@
           <a:p>
             <a:r>
               <a:rPr lang="en-US" dirty="0"/>
-              <a:t>Data Analysis</a:t>
+              <a:t>Overall crime trends 2009-2020</a:t>
             </a:r>
           </a:p>
         </p:txBody>
@@ -4284,6 +4768,83 @@
           </a:p>
         </p:txBody>
       </p:sp>
+      <p:pic>
+        <p:nvPicPr>
+          <p:cNvPr id="7" name="Picture 6" descr="Chart, bar chart&#10;&#10;Description automatically generated">
+            <a:extLst>
+              <a:ext uri="{FF2B5EF4-FFF2-40B4-BE49-F238E27FC236}">
+                <a16:creationId xmlns:a16="http://schemas.microsoft.com/office/drawing/2014/main" id="{4FB1C592-1C54-4AFC-95D6-47B7705AA5F8}"/>
+              </a:ext>
+            </a:extLst>
+          </p:cNvPr>
+          <p:cNvPicPr>
+            <a:picLocks noChangeAspect="1"/>
+          </p:cNvPicPr>
+          <p:nvPr/>
+        </p:nvPicPr>
+        <p:blipFill>
+          <a:blip r:embed="rId2"/>
+          <a:stretch>
+            <a:fillRect/>
+          </a:stretch>
+        </p:blipFill>
+        <p:spPr>
+          <a:xfrm>
+            <a:off x="89575" y="1948611"/>
+            <a:ext cx="6511990" cy="4341327"/>
+          </a:xfrm>
+          <a:prstGeom prst="rect">
+            <a:avLst/>
+          </a:prstGeom>
+        </p:spPr>
+      </p:pic>
+      <p:pic>
+        <p:nvPicPr>
+          <p:cNvPr id="1026" name="Picture 2">
+            <a:extLst>
+              <a:ext uri="{FF2B5EF4-FFF2-40B4-BE49-F238E27FC236}">
+                <a16:creationId xmlns:a16="http://schemas.microsoft.com/office/drawing/2014/main" id="{25DD4E61-4F6F-47A8-9C52-0D8C8D252230}"/>
+              </a:ext>
+            </a:extLst>
+          </p:cNvPr>
+          <p:cNvPicPr>
+            <a:picLocks noChangeAspect="1" noChangeArrowheads="1"/>
+          </p:cNvPicPr>
+          <p:nvPr/>
+        </p:nvPicPr>
+        <p:blipFill>
+          <a:blip r:embed="rId3">
+            <a:extLst>
+              <a:ext uri="{28A0092B-C50C-407E-A947-70E740481C1C}">
+                <a14:useLocalDpi xmlns:a14="http://schemas.microsoft.com/office/drawing/2010/main" val="0"/>
+              </a:ext>
+            </a:extLst>
+          </a:blip>
+          <a:srcRect/>
+          <a:stretch>
+            <a:fillRect/>
+          </a:stretch>
+        </p:blipFill>
+        <p:spPr bwMode="auto">
+          <a:xfrm>
+            <a:off x="6420708" y="2789892"/>
+            <a:ext cx="5401918" cy="3079200"/>
+          </a:xfrm>
+          <a:prstGeom prst="rect">
+            <a:avLst/>
+          </a:prstGeom>
+          <a:noFill/>
+          <a:extLst>
+            <a:ext uri="{909E8E84-426E-40DD-AFC4-6F175D3DCCD1}">
+              <a14:hiddenFill xmlns:a14="http://schemas.microsoft.com/office/drawing/2010/main">
+                <a:solidFill>
+                  <a:srgbClr val="FFFFFF"/>
+                </a:solidFill>
+              </a14:hiddenFill>
+            </a:ext>
+          </a:extLst>
+        </p:spPr>
+      </p:pic>
     </p:spTree>
     <p:extLst>
       <p:ext uri="{BB962C8B-B14F-4D97-AF65-F5344CB8AC3E}">
@@ -4319,7 +4880,7 @@
           <p:cNvPr id="2" name="Title 1">
             <a:extLst>
               <a:ext uri="{FF2B5EF4-FFF2-40B4-BE49-F238E27FC236}">
-                <a16:creationId xmlns:a16="http://schemas.microsoft.com/office/drawing/2014/main" id="{F1F68E24-76C8-457B-A274-B5A2775BDD21}"/>
+                <a16:creationId xmlns:a16="http://schemas.microsoft.com/office/drawing/2014/main" id="{FBB1671F-FC9A-49CE-AA3B-05003B2B98A8}"/>
               </a:ext>
             </a:extLst>
           </p:cNvPr>
@@ -4337,7 +4898,7 @@
           <a:p>
             <a:r>
               <a:rPr lang="en-US" dirty="0"/>
-              <a:t>Discussion/Conclusions</a:t>
+              <a:t>Bar chart crime types – violent &amp; nonviolent  2018-2020</a:t>
             </a:r>
           </a:p>
         </p:txBody>
@@ -4347,7 +4908,7 @@
           <p:cNvPr id="3" name="Content Placeholder 2">
             <a:extLst>
               <a:ext uri="{FF2B5EF4-FFF2-40B4-BE49-F238E27FC236}">
-                <a16:creationId xmlns:a16="http://schemas.microsoft.com/office/drawing/2014/main" id="{EE297F6F-7E84-4BDD-8ACA-A0E58C2A6D7E}"/>
+                <a16:creationId xmlns:a16="http://schemas.microsoft.com/office/drawing/2014/main" id="{B7FB87A7-D845-4972-91CB-BD511E0D960F}"/>
               </a:ext>
             </a:extLst>
           </p:cNvPr>
@@ -4363,14 +4924,14 @@
           <a:bodyPr/>
           <a:lstStyle/>
           <a:p>
-            <a:endParaRPr lang="en-US"/>
+            <a:endParaRPr lang="en-US" dirty="0"/>
           </a:p>
         </p:txBody>
       </p:sp>
     </p:spTree>
     <p:extLst>
       <p:ext uri="{BB962C8B-B14F-4D97-AF65-F5344CB8AC3E}">
-        <p14:creationId xmlns:p14="http://schemas.microsoft.com/office/powerpoint/2010/main" val="3912194499"/>
+        <p14:creationId xmlns:p14="http://schemas.microsoft.com/office/powerpoint/2010/main" val="504929660"/>
       </p:ext>
     </p:extLst>
   </p:cSld>
@@ -4402,7 +4963,7 @@
           <p:cNvPr id="2" name="Title 1">
             <a:extLst>
               <a:ext uri="{FF2B5EF4-FFF2-40B4-BE49-F238E27FC236}">
-                <a16:creationId xmlns:a16="http://schemas.microsoft.com/office/drawing/2014/main" id="{B7E2B5F8-0077-435F-B9B1-06619D2839A2}"/>
+                <a16:creationId xmlns:a16="http://schemas.microsoft.com/office/drawing/2014/main" id="{254F74F3-5779-4C0E-9EF7-7831B9FC9D85}"/>
               </a:ext>
             </a:extLst>
           </p:cNvPr>
@@ -4420,7 +4981,7 @@
           <a:p>
             <a:r>
               <a:rPr lang="en-US" dirty="0"/>
-              <a:t>If we had more time, we would…</a:t>
+              <a:t>Seasons 2018-2020</a:t>
             </a:r>
           </a:p>
         </p:txBody>
@@ -4430,7 +4991,7 @@
           <p:cNvPr id="3" name="Content Placeholder 2">
             <a:extLst>
               <a:ext uri="{FF2B5EF4-FFF2-40B4-BE49-F238E27FC236}">
-                <a16:creationId xmlns:a16="http://schemas.microsoft.com/office/drawing/2014/main" id="{D558455A-8EC9-4BCE-9B1D-233E2337B359}"/>
+                <a16:creationId xmlns:a16="http://schemas.microsoft.com/office/drawing/2014/main" id="{5A2ACFCE-09F5-4D1C-922F-7E7988F2EC1D}"/>
               </a:ext>
             </a:extLst>
           </p:cNvPr>
@@ -4446,64 +5007,14 @@
           <a:bodyPr/>
           <a:lstStyle/>
           <a:p>
-            <a:r>
-              <a:rPr lang="en-US" dirty="0"/>
-              <a:t>List of things we didn’t have time to discuss here…</a:t>
-            </a:r>
-          </a:p>
-        </p:txBody>
-      </p:sp>
-      <p:pic>
-        <p:nvPicPr>
-          <p:cNvPr id="2050" name="Picture 2" descr="Image result for never enough time">
-            <a:extLst>
-              <a:ext uri="{FF2B5EF4-FFF2-40B4-BE49-F238E27FC236}">
-                <a16:creationId xmlns:a16="http://schemas.microsoft.com/office/drawing/2014/main" id="{7A134D72-AA15-45B0-835B-0A2A1C66B324}"/>
-              </a:ext>
-            </a:extLst>
-          </p:cNvPr>
-          <p:cNvPicPr>
-            <a:picLocks noChangeAspect="1" noChangeArrowheads="1"/>
-          </p:cNvPicPr>
-          <p:nvPr/>
-        </p:nvPicPr>
-        <p:blipFill>
-          <a:blip r:embed="rId2">
-            <a:extLst>
-              <a:ext uri="{28A0092B-C50C-407E-A947-70E740481C1C}">
-                <a14:useLocalDpi xmlns:a14="http://schemas.microsoft.com/office/drawing/2010/main" val="0"/>
-              </a:ext>
-            </a:extLst>
-          </a:blip>
-          <a:srcRect/>
-          <a:stretch>
-            <a:fillRect/>
-          </a:stretch>
-        </p:blipFill>
-        <p:spPr bwMode="auto">
-          <a:xfrm>
-            <a:off x="8000617" y="1996750"/>
-            <a:ext cx="3155063" cy="2460949"/>
-          </a:xfrm>
-          <a:prstGeom prst="rect">
-            <a:avLst/>
-          </a:prstGeom>
-          <a:noFill/>
-          <a:extLst>
-            <a:ext uri="{909E8E84-426E-40DD-AFC4-6F175D3DCCD1}">
-              <a14:hiddenFill xmlns:a14="http://schemas.microsoft.com/office/drawing/2010/main">
-                <a:solidFill>
-                  <a:srgbClr val="FFFFFF"/>
-                </a:solidFill>
-              </a14:hiddenFill>
-            </a:ext>
-          </a:extLst>
-        </p:spPr>
-      </p:pic>
+            <a:endParaRPr lang="en-US"/>
+          </a:p>
+        </p:txBody>
+      </p:sp>
     </p:spTree>
     <p:extLst>
       <p:ext uri="{BB962C8B-B14F-4D97-AF65-F5344CB8AC3E}">
-        <p14:creationId xmlns:p14="http://schemas.microsoft.com/office/powerpoint/2010/main" val="701140825"/>
+        <p14:creationId xmlns:p14="http://schemas.microsoft.com/office/powerpoint/2010/main" val="2696354913"/>
       </p:ext>
     </p:extLst>
   </p:cSld>
@@ -4535,7 +5046,7 @@
           <p:cNvPr id="2" name="Title 1">
             <a:extLst>
               <a:ext uri="{FF2B5EF4-FFF2-40B4-BE49-F238E27FC236}">
-                <a16:creationId xmlns:a16="http://schemas.microsoft.com/office/drawing/2014/main" id="{63E93BFB-3B43-4DF0-9A59-B35DF5F698E2}"/>
+                <a16:creationId xmlns:a16="http://schemas.microsoft.com/office/drawing/2014/main" id="{46B7A6DE-E8C2-4B5A-97BF-9FE371ACC489}"/>
               </a:ext>
             </a:extLst>
           </p:cNvPr>
@@ -4553,17 +5064,250 @@
           <a:p>
             <a:r>
               <a:rPr lang="en-US" dirty="0"/>
-              <a:t>Questions</a:t>
-            </a:r>
-          </a:p>
-        </p:txBody>
-      </p:sp>
+              <a:t>Months 2018-2020</a:t>
+            </a:r>
+          </a:p>
+        </p:txBody>
+      </p:sp>
+      <p:sp>
+        <p:nvSpPr>
+          <p:cNvPr id="3" name="Content Placeholder 2">
+            <a:extLst>
+              <a:ext uri="{FF2B5EF4-FFF2-40B4-BE49-F238E27FC236}">
+                <a16:creationId xmlns:a16="http://schemas.microsoft.com/office/drawing/2014/main" id="{4D9DA9B2-5A8B-401A-A41A-6C8457932E0D}"/>
+              </a:ext>
+            </a:extLst>
+          </p:cNvPr>
+          <p:cNvSpPr>
+            <a:spLocks noGrp="1"/>
+          </p:cNvSpPr>
+          <p:nvPr>
+            <p:ph idx="1"/>
+          </p:nvPr>
+        </p:nvSpPr>
+        <p:spPr/>
+        <p:txBody>
+          <a:bodyPr/>
+          <a:lstStyle/>
+          <a:p>
+            <a:endParaRPr lang="en-US"/>
+          </a:p>
+        </p:txBody>
+      </p:sp>
+    </p:spTree>
+    <p:extLst>
+      <p:ext uri="{BB962C8B-B14F-4D97-AF65-F5344CB8AC3E}">
+        <p14:creationId xmlns:p14="http://schemas.microsoft.com/office/powerpoint/2010/main" val="849180082"/>
+      </p:ext>
+    </p:extLst>
+  </p:cSld>
+  <p:clrMapOvr>
+    <a:masterClrMapping/>
+  </p:clrMapOvr>
+</p:sld>
+</file>
+
+<file path=ppt/slides/slide8.xml><?xml version="1.0" encoding="utf-8"?>
+<p:sld xmlns:a="http://schemas.openxmlformats.org/drawingml/2006/main" xmlns:r="http://schemas.openxmlformats.org/officeDocument/2006/relationships" xmlns:p="http://schemas.openxmlformats.org/presentationml/2006/main">
+  <p:cSld>
+    <p:spTree>
+      <p:nvGrpSpPr>
+        <p:cNvPr id="1" name=""/>
+        <p:cNvGrpSpPr/>
+        <p:nvPr/>
+      </p:nvGrpSpPr>
+      <p:grpSpPr>
+        <a:xfrm>
+          <a:off x="0" y="0"/>
+          <a:ext cx="0" cy="0"/>
+          <a:chOff x="0" y="0"/>
+          <a:chExt cx="0" cy="0"/>
+        </a:xfrm>
+      </p:grpSpPr>
       <p:pic>
         <p:nvPicPr>
-          <p:cNvPr id="4" name="Picture 2" descr="https://s-i.huffpost.com/gen/2774246/images/o-ASKING-QUESTIONS-facebook.jpg">
-            <a:extLst>
-              <a:ext uri="{FF2B5EF4-FFF2-40B4-BE49-F238E27FC236}">
-                <a16:creationId xmlns:a16="http://schemas.microsoft.com/office/drawing/2014/main" id="{1C787EA6-550A-428D-B577-6FEEA70CA890}"/>
+          <p:cNvPr id="5" name="Picture 4" descr="Chart, bar chart&#10;&#10;Description automatically generated">
+            <a:extLst>
+              <a:ext uri="{FF2B5EF4-FFF2-40B4-BE49-F238E27FC236}">
+                <a16:creationId xmlns:a16="http://schemas.microsoft.com/office/drawing/2014/main" id="{7D43AF75-FB8A-4F9D-9CB5-AF390B813B65}"/>
+              </a:ext>
+            </a:extLst>
+          </p:cNvPr>
+          <p:cNvPicPr>
+            <a:picLocks noChangeAspect="1"/>
+          </p:cNvPicPr>
+          <p:nvPr/>
+        </p:nvPicPr>
+        <p:blipFill>
+          <a:blip r:embed="rId2"/>
+          <a:stretch>
+            <a:fillRect/>
+          </a:stretch>
+        </p:blipFill>
+        <p:spPr>
+          <a:xfrm>
+            <a:off x="0" y="326572"/>
+            <a:ext cx="6712116" cy="2973554"/>
+          </a:xfrm>
+          <a:prstGeom prst="rect">
+            <a:avLst/>
+          </a:prstGeom>
+        </p:spPr>
+      </p:pic>
+      <p:pic>
+        <p:nvPicPr>
+          <p:cNvPr id="7" name="Picture 6" descr="Chart, bar chart&#10;&#10;Description automatically generated">
+            <a:extLst>
+              <a:ext uri="{FF2B5EF4-FFF2-40B4-BE49-F238E27FC236}">
+                <a16:creationId xmlns:a16="http://schemas.microsoft.com/office/drawing/2014/main" id="{EEA023C5-C8B6-41B7-A3EF-DD5E38FA0E3F}"/>
+              </a:ext>
+            </a:extLst>
+          </p:cNvPr>
+          <p:cNvPicPr>
+            <a:picLocks noChangeAspect="1"/>
+          </p:cNvPicPr>
+          <p:nvPr/>
+        </p:nvPicPr>
+        <p:blipFill>
+          <a:blip r:embed="rId3"/>
+          <a:stretch>
+            <a:fillRect/>
+          </a:stretch>
+        </p:blipFill>
+        <p:spPr>
+          <a:xfrm>
+            <a:off x="5278016" y="2223895"/>
+            <a:ext cx="7081935" cy="3777032"/>
+          </a:xfrm>
+          <a:prstGeom prst="rect">
+            <a:avLst/>
+          </a:prstGeom>
+        </p:spPr>
+      </p:pic>
+    </p:spTree>
+    <p:extLst>
+      <p:ext uri="{BB962C8B-B14F-4D97-AF65-F5344CB8AC3E}">
+        <p14:creationId xmlns:p14="http://schemas.microsoft.com/office/powerpoint/2010/main" val="2655803325"/>
+      </p:ext>
+    </p:extLst>
+  </p:cSld>
+  <p:clrMapOvr>
+    <a:masterClrMapping/>
+  </p:clrMapOvr>
+</p:sld>
+</file>
+
+<file path=ppt/slides/slide9.xml><?xml version="1.0" encoding="utf-8"?>
+<p:sld xmlns:a="http://schemas.openxmlformats.org/drawingml/2006/main" xmlns:r="http://schemas.openxmlformats.org/officeDocument/2006/relationships" xmlns:p="http://schemas.openxmlformats.org/presentationml/2006/main">
+  <p:cSld>
+    <p:spTree>
+      <p:nvGrpSpPr>
+        <p:cNvPr id="1" name=""/>
+        <p:cNvGrpSpPr/>
+        <p:nvPr/>
+      </p:nvGrpSpPr>
+      <p:grpSpPr>
+        <a:xfrm>
+          <a:off x="0" y="0"/>
+          <a:ext cx="0" cy="0"/>
+          <a:chOff x="0" y="0"/>
+          <a:chExt cx="0" cy="0"/>
+        </a:xfrm>
+      </p:grpSpPr>
+      <p:pic>
+        <p:nvPicPr>
+          <p:cNvPr id="2" name="Picture 1" descr="Chart, bar chart&#10;&#10;Description automatically generated">
+            <a:extLst>
+              <a:ext uri="{FF2B5EF4-FFF2-40B4-BE49-F238E27FC236}">
+                <a16:creationId xmlns:a16="http://schemas.microsoft.com/office/drawing/2014/main" id="{AC00CDAA-AD4B-4E08-A0DD-21288E890B4A}"/>
+              </a:ext>
+            </a:extLst>
+          </p:cNvPr>
+          <p:cNvPicPr>
+            <a:picLocks noChangeAspect="1"/>
+          </p:cNvPicPr>
+          <p:nvPr/>
+        </p:nvPicPr>
+        <p:blipFill>
+          <a:blip r:embed="rId2"/>
+          <a:stretch>
+            <a:fillRect/>
+          </a:stretch>
+        </p:blipFill>
+        <p:spPr>
+          <a:xfrm>
+            <a:off x="214871" y="1979956"/>
+            <a:ext cx="5802864" cy="3868576"/>
+          </a:xfrm>
+          <a:prstGeom prst="rect">
+            <a:avLst/>
+          </a:prstGeom>
+        </p:spPr>
+      </p:pic>
+      <p:sp>
+        <p:nvSpPr>
+          <p:cNvPr id="3" name="Title 2">
+            <a:extLst>
+              <a:ext uri="{FF2B5EF4-FFF2-40B4-BE49-F238E27FC236}">
+                <a16:creationId xmlns:a16="http://schemas.microsoft.com/office/drawing/2014/main" id="{CE77B935-2797-478F-9176-CA9BDE4257FD}"/>
+              </a:ext>
+            </a:extLst>
+          </p:cNvPr>
+          <p:cNvSpPr>
+            <a:spLocks noGrp="1"/>
+          </p:cNvSpPr>
+          <p:nvPr>
+            <p:ph type="title"/>
+          </p:nvPr>
+        </p:nvSpPr>
+        <p:spPr/>
+        <p:txBody>
+          <a:bodyPr/>
+          <a:lstStyle/>
+          <a:p>
+            <a:r>
+              <a:rPr lang="en-US" dirty="0"/>
+              <a:t>Homicides &amp; Burg (change to 2018-2020)</a:t>
+            </a:r>
+          </a:p>
+        </p:txBody>
+      </p:sp>
+      <p:sp>
+        <p:nvSpPr>
+          <p:cNvPr id="8" name="Content Placeholder 7">
+            <a:extLst>
+              <a:ext uri="{FF2B5EF4-FFF2-40B4-BE49-F238E27FC236}">
+                <a16:creationId xmlns:a16="http://schemas.microsoft.com/office/drawing/2014/main" id="{33FF3B41-61D5-47AC-97C7-87667A1088A2}"/>
+              </a:ext>
+            </a:extLst>
+          </p:cNvPr>
+          <p:cNvSpPr>
+            <a:spLocks noGrp="1"/>
+          </p:cNvSpPr>
+          <p:nvPr>
+            <p:ph idx="1"/>
+          </p:nvPr>
+        </p:nvSpPr>
+        <p:spPr>
+          <a:xfrm>
+            <a:off x="7498080" y="1548554"/>
+            <a:ext cx="10058400" cy="3760891"/>
+          </a:xfrm>
+        </p:spPr>
+        <p:txBody>
+          <a:bodyPr/>
+          <a:lstStyle/>
+          <a:p>
+            <a:endParaRPr lang="en-US"/>
+          </a:p>
+        </p:txBody>
+      </p:sp>
+      <p:pic>
+        <p:nvPicPr>
+          <p:cNvPr id="2050" name="Picture 2">
+            <a:extLst>
+              <a:ext uri="{FF2B5EF4-FFF2-40B4-BE49-F238E27FC236}">
+                <a16:creationId xmlns:a16="http://schemas.microsoft.com/office/drawing/2014/main" id="{D0E876C4-2049-4EC1-8AB6-4D53B03044EE}"/>
               </a:ext>
             </a:extLst>
           </p:cNvPr>
@@ -4573,7 +5317,7 @@
           <p:nvPr/>
         </p:nvPicPr>
         <p:blipFill>
-          <a:blip r:embed="rId2" cstate="print">
+          <a:blip r:embed="rId3">
             <a:extLst>
               <a:ext uri="{28A0092B-C50C-407E-A947-70E740481C1C}">
                 <a14:useLocalDpi xmlns:a14="http://schemas.microsoft.com/office/drawing/2010/main" val="0"/>
@@ -4587,8 +5331,8 @@
         </p:blipFill>
         <p:spPr bwMode="auto">
           <a:xfrm>
-            <a:off x="1931324" y="2186248"/>
-            <a:ext cx="7620000" cy="3810000"/>
+            <a:off x="6174266" y="2435050"/>
+            <a:ext cx="5752068" cy="3107192"/>
           </a:xfrm>
           <a:prstGeom prst="rect">
             <a:avLst/>
@@ -4608,7 +5352,7 @@
     </p:spTree>
     <p:extLst>
       <p:ext uri="{BB962C8B-B14F-4D97-AF65-F5344CB8AC3E}">
-        <p14:creationId xmlns:p14="http://schemas.microsoft.com/office/powerpoint/2010/main" val="145803504"/>
+        <p14:creationId xmlns:p14="http://schemas.microsoft.com/office/powerpoint/2010/main" val="2511073613"/>
       </p:ext>
     </p:extLst>
   </p:cSld>
@@ -4945,6 +5689,24 @@
 </file>
 
 <file path=customXml/item1.xml><?xml version="1.0" encoding="utf-8"?>
+<?mso-contentType ?>
+<FormTemplates xmlns="http://schemas.microsoft.com/sharepoint/v3/contenttype/forms">
+  <Display>DocumentLibraryForm</Display>
+  <Edit>DocumentLibraryForm</Edit>
+  <New>DocumentLibraryForm</New>
+</FormTemplates>
+</file>
+
+<file path=customXml/item2.xml><?xml version="1.0" encoding="utf-8"?>
+<p:properties xmlns:p="http://schemas.microsoft.com/office/2006/metadata/properties" xmlns:xsi="http://www.w3.org/2001/XMLSchema-instance" xmlns:pc="http://schemas.microsoft.com/office/infopath/2007/PartnerControls">
+  <documentManagement>
+    <Status xmlns="71af3243-3dd4-4a8d-8c0d-dd76da1f02a5">Not started</Status>
+    <MediaServiceKeyPoints xmlns="71af3243-3dd4-4a8d-8c0d-dd76da1f02a5" xsi:nil="true"/>
+  </documentManagement>
+</p:properties>
+</file>
+
+<file path=customXml/item3.xml><?xml version="1.0" encoding="utf-8"?>
 <ct:contentTypeSchema xmlns:ct="http://schemas.microsoft.com/office/2006/metadata/contentType" xmlns:ma="http://schemas.microsoft.com/office/2006/metadata/properties/metaAttributes" ct:_="" ma:_="" ma:contentTypeName="Document" ma:contentTypeID="0x01010079F111ED35F8CC479449609E8A0923A6" ma:contentTypeVersion="12" ma:contentTypeDescription="Create a new document." ma:contentTypeScope="" ma:versionID="a410dd7f93c95333ffa1b60ed6adedd1">
   <xsd:schema xmlns:xsd="http://www.w3.org/2001/XMLSchema" xmlns:xs="http://www.w3.org/2001/XMLSchema" xmlns:p="http://schemas.microsoft.com/office/2006/metadata/properties" xmlns:ns2="71af3243-3dd4-4a8d-8c0d-dd76da1f02a5" xmlns:ns3="16c05727-aa75-4e4a-9b5f-8a80a1165891" targetNamespace="http://schemas.microsoft.com/office/2006/metadata/properties" ma:root="true" ma:fieldsID="a936d9baba76aa3866493feff160faab" ns2:_="" ns3:_="">
     <xsd:import namespace="71af3243-3dd4-4a8d-8c0d-dd76da1f02a5"/>
@@ -5165,25 +5927,25 @@
 </ct:contentTypeSchema>
 </file>
 
-<file path=customXml/item2.xml><?xml version="1.0" encoding="utf-8"?>
-<p:properties xmlns:p="http://schemas.microsoft.com/office/2006/metadata/properties" xmlns:xsi="http://www.w3.org/2001/XMLSchema-instance" xmlns:pc="http://schemas.microsoft.com/office/infopath/2007/PartnerControls">
-  <documentManagement>
-    <Status xmlns="71af3243-3dd4-4a8d-8c0d-dd76da1f02a5">Not started</Status>
-    <MediaServiceKeyPoints xmlns="71af3243-3dd4-4a8d-8c0d-dd76da1f02a5" xsi:nil="true"/>
-  </documentManagement>
-</p:properties>
+<file path=customXml/itemProps1.xml><?xml version="1.0" encoding="utf-8"?>
+<ds:datastoreItem xmlns:ds="http://schemas.openxmlformats.org/officeDocument/2006/customXml" ds:itemID="{AA3F7EDC-E5B4-4BBC-9D2A-CBE6D46C37AD}">
+  <ds:schemaRefs>
+    <ds:schemaRef ds:uri="http://schemas.microsoft.com/sharepoint/v3/contenttype/forms"/>
+  </ds:schemaRefs>
+</ds:datastoreItem>
 </file>
 
-<file path=customXml/item3.xml><?xml version="1.0" encoding="utf-8"?>
-<?mso-contentType ?>
-<FormTemplates xmlns="http://schemas.microsoft.com/sharepoint/v3/contenttype/forms">
-  <Display>DocumentLibraryForm</Display>
-  <Edit>DocumentLibraryForm</Edit>
-  <New>DocumentLibraryForm</New>
-</FormTemplates>
+<file path=customXml/itemProps2.xml><?xml version="1.0" encoding="utf-8"?>
+<ds:datastoreItem xmlns:ds="http://schemas.openxmlformats.org/officeDocument/2006/customXml" ds:itemID="{A03EEFF0-FB57-4CB4-8BFC-DF397689E2ED}">
+  <ds:schemaRefs>
+    <ds:schemaRef ds:uri="http://schemas.microsoft.com/office/2006/metadata/properties"/>
+    <ds:schemaRef ds:uri="http://schemas.microsoft.com/office/infopath/2007/PartnerControls"/>
+    <ds:schemaRef ds:uri="71af3243-3dd4-4a8d-8c0d-dd76da1f02a5"/>
+  </ds:schemaRefs>
+</ds:datastoreItem>
 </file>
 
-<file path=customXml/itemProps1.xml><?xml version="1.0" encoding="utf-8"?>
+<file path=customXml/itemProps3.xml><?xml version="1.0" encoding="utf-8"?>
 <ds:datastoreItem xmlns:ds="http://schemas.openxmlformats.org/officeDocument/2006/customXml" ds:itemID="{93932EF5-314F-409E-8020-FEE5FA0795B9}">
   <ds:schemaRefs>
     <ds:schemaRef ds:uri="http://schemas.microsoft.com/office/2006/metadata/contentType"/>
@@ -5200,22 +5962,4 @@
     <ds:schemaRef ds:uri="http://schemas.microsoft.com/internal/obd"/>
   </ds:schemaRefs>
 </ds:datastoreItem>
-</file>
-
-<file path=customXml/itemProps2.xml><?xml version="1.0" encoding="utf-8"?>
-<ds:datastoreItem xmlns:ds="http://schemas.openxmlformats.org/officeDocument/2006/customXml" ds:itemID="{A03EEFF0-FB57-4CB4-8BFC-DF397689E2ED}">
-  <ds:schemaRefs>
-    <ds:schemaRef ds:uri="http://schemas.microsoft.com/office/2006/metadata/properties"/>
-    <ds:schemaRef ds:uri="http://schemas.microsoft.com/office/infopath/2007/PartnerControls"/>
-    <ds:schemaRef ds:uri="71af3243-3dd4-4a8d-8c0d-dd76da1f02a5"/>
-  </ds:schemaRefs>
-</ds:datastoreItem>
-</file>
-
-<file path=customXml/itemProps3.xml><?xml version="1.0" encoding="utf-8"?>
-<ds:datastoreItem xmlns:ds="http://schemas.openxmlformats.org/officeDocument/2006/customXml" ds:itemID="{AA3F7EDC-E5B4-4BBC-9D2A-CBE6D46C37AD}">
-  <ds:schemaRefs>
-    <ds:schemaRef ds:uri="http://schemas.microsoft.com/sharepoint/v3/contenttype/forms"/>
-  </ds:schemaRefs>
-</ds:datastoreItem>
 </file>
</xml_diff>